<commit_message>
Corrected backpropagation and processing predicted nested lists
</commit_message>
<xml_diff>
--- a/Prediction of Stock Market Prices.pptx
+++ b/Prediction of Stock Market Prices.pptx
@@ -7,7 +7,8 @@
   <p:sldIdLst>
     <p:sldId id="256" r:id="rId2"/>
     <p:sldId id="257" r:id="rId3"/>
-    <p:sldId id="258" r:id="rId4"/>
+    <p:sldId id="259" r:id="rId4"/>
+    <p:sldId id="258" r:id="rId5"/>
   </p:sldIdLst>
   <p:sldSz cx="9144000" cy="6858000" type="screen4x3"/>
   <p:notesSz cx="6858000" cy="9144000"/>
@@ -4121,17 +4122,39 @@
             </a:r>
             <a:r>
               <a:rPr lang="en-US" dirty="0" smtClean="0"/>
-              <a:t> of data, our gradients become too small or too large. </a:t>
-            </a:r>
-          </a:p>
-          <a:p>
+              <a:t> of data, our gradients become too </a:t>
+            </a:r>
+            <a:r>
+              <a:rPr lang="en-US" dirty="0" smtClean="0"/>
+              <a:t>small after </a:t>
+            </a:r>
+            <a:r>
+              <a:rPr lang="en-US" dirty="0" err="1" smtClean="0"/>
+              <a:t>Backpropagation</a:t>
+            </a:r>
+            <a:r>
+              <a:rPr lang="en-US" dirty="0" smtClean="0"/>
+              <a:t> algorithm. </a:t>
+            </a:r>
             <a:endParaRPr lang="en-US" dirty="0" smtClean="0"/>
           </a:p>
           <a:p>
+            <a:endParaRPr lang="en-US" dirty="0" smtClean="0"/>
+          </a:p>
+          <a:p>
             <a:r>
               <a:rPr lang="en-US" dirty="0" smtClean="0"/>
-              <a:t>LSTM solves this problem with internal memory.</a:t>
-            </a:r>
+              <a:t>LSTM solves this problem with internal </a:t>
+            </a:r>
+            <a:r>
+              <a:rPr lang="en-US" dirty="0" smtClean="0"/>
+              <a:t>memory, so it can memorize </a:t>
+            </a:r>
+            <a:r>
+              <a:rPr lang="en-US" dirty="0" smtClean="0"/>
+              <a:t>data for a long-term.</a:t>
+            </a:r>
+            <a:endParaRPr lang="en-US" dirty="0" smtClean="0"/>
           </a:p>
           <a:p>
             <a:endParaRPr lang="en-US" dirty="0" smtClean="0"/>
@@ -4172,7 +4195,6 @@
               <a:rPr lang="en-US" dirty="0" smtClean="0"/>
               <a:t> of being slower than RNN.</a:t>
             </a:r>
-            <a:endParaRPr lang="en-US" dirty="0" smtClean="0"/>
           </a:p>
         </p:txBody>
       </p:sp>
@@ -4185,6 +4207,233 @@
 </file>
 
 <file path=ppt/slides/slide3.xml><?xml version="1.0" encoding="utf-8"?>
+<p:sld xmlns:a="http://schemas.openxmlformats.org/drawingml/2006/main" xmlns:r="http://schemas.openxmlformats.org/officeDocument/2006/relationships" xmlns:p="http://schemas.openxmlformats.org/presentationml/2006/main">
+  <p:cSld>
+    <p:spTree>
+      <p:nvGrpSpPr>
+        <p:cNvPr id="1" name=""/>
+        <p:cNvGrpSpPr/>
+        <p:nvPr/>
+      </p:nvGrpSpPr>
+      <p:grpSpPr>
+        <a:xfrm>
+          <a:off x="0" y="0"/>
+          <a:ext cx="0" cy="0"/>
+          <a:chOff x="0" y="0"/>
+          <a:chExt cx="0" cy="0"/>
+        </a:xfrm>
+      </p:grpSpPr>
+      <p:sp>
+        <p:nvSpPr>
+          <p:cNvPr id="2" name="Title 1"/>
+          <p:cNvSpPr>
+            <a:spLocks noGrp="1"/>
+          </p:cNvSpPr>
+          <p:nvPr>
+            <p:ph type="title"/>
+          </p:nvPr>
+        </p:nvSpPr>
+        <p:spPr>
+          <a:xfrm>
+            <a:off x="228600" y="152400"/>
+            <a:ext cx="7772400" cy="1002792"/>
+          </a:xfrm>
+        </p:spPr>
+        <p:txBody>
+          <a:bodyPr/>
+          <a:lstStyle/>
+          <a:p>
+            <a:r>
+              <a:rPr lang="en-US" dirty="0" smtClean="0"/>
+              <a:t>Tools and libraries</a:t>
+            </a:r>
+            <a:endParaRPr lang="en-US" dirty="0"/>
+          </a:p>
+        </p:txBody>
+      </p:sp>
+      <p:sp>
+        <p:nvSpPr>
+          <p:cNvPr id="3" name="Text Placeholder 2"/>
+          <p:cNvSpPr>
+            <a:spLocks noGrp="1"/>
+          </p:cNvSpPr>
+          <p:nvPr>
+            <p:ph type="body" idx="1"/>
+          </p:nvPr>
+        </p:nvSpPr>
+        <p:spPr>
+          <a:xfrm>
+            <a:off x="530352" y="1295400"/>
+            <a:ext cx="7772400" cy="5105400"/>
+          </a:xfrm>
+        </p:spPr>
+        <p:txBody>
+          <a:bodyPr/>
+          <a:lstStyle/>
+          <a:p>
+            <a:pPr>
+              <a:buFontTx/>
+              <a:buChar char="-"/>
+            </a:pPr>
+            <a:r>
+              <a:rPr lang="en-US" b="1" dirty="0" smtClean="0">
+                <a:latin typeface="+mj-lt"/>
+              </a:rPr>
+              <a:t>Google </a:t>
+            </a:r>
+            <a:r>
+              <a:rPr lang="en-US" b="1" dirty="0" err="1" smtClean="0">
+                <a:latin typeface="+mj-lt"/>
+              </a:rPr>
+              <a:t>Colaboratory</a:t>
+            </a:r>
+            <a:r>
+              <a:rPr lang="en-US" b="1" dirty="0" smtClean="0">
+                <a:latin typeface="+mj-lt"/>
+              </a:rPr>
+              <a:t> </a:t>
+            </a:r>
+            <a:r>
+              <a:rPr lang="en-US" dirty="0" smtClean="0">
+                <a:latin typeface="+mj-lt"/>
+              </a:rPr>
+              <a:t>as development environment with GPUs  (</a:t>
+            </a:r>
+            <a:r>
+              <a:rPr lang="en-US" dirty="0" err="1" smtClean="0">
+                <a:latin typeface="+mj-lt"/>
+              </a:rPr>
+              <a:t>SaaS</a:t>
+            </a:r>
+            <a:r>
+              <a:rPr lang="en-US" dirty="0" smtClean="0">
+                <a:latin typeface="+mj-lt"/>
+              </a:rPr>
+              <a:t> + </a:t>
+            </a:r>
+            <a:r>
+              <a:rPr lang="en-US" dirty="0" err="1" smtClean="0">
+                <a:latin typeface="+mj-lt"/>
+              </a:rPr>
+              <a:t>IaaS</a:t>
+            </a:r>
+            <a:r>
+              <a:rPr lang="en-US" dirty="0" smtClean="0">
+                <a:latin typeface="+mj-lt"/>
+              </a:rPr>
+              <a:t>)</a:t>
+            </a:r>
+          </a:p>
+          <a:p>
+            <a:pPr>
+              <a:buFontTx/>
+              <a:buChar char="-"/>
+            </a:pPr>
+            <a:r>
+              <a:rPr lang="en-US" dirty="0" smtClean="0">
+                <a:latin typeface="+mj-lt"/>
+              </a:rPr>
+              <a:t>Programming language: Python 3.6</a:t>
+            </a:r>
+          </a:p>
+          <a:p>
+            <a:pPr>
+              <a:buFontTx/>
+              <a:buChar char="-"/>
+            </a:pPr>
+            <a:r>
+              <a:rPr lang="en-US" dirty="0" smtClean="0">
+                <a:latin typeface="+mj-lt"/>
+              </a:rPr>
+              <a:t>Libraries:</a:t>
+            </a:r>
+          </a:p>
+          <a:p>
+            <a:pPr>
+              <a:buFontTx/>
+              <a:buChar char="-"/>
+            </a:pPr>
+            <a:endParaRPr lang="en-US" dirty="0" smtClean="0"/>
+          </a:p>
+          <a:p>
+            <a:pPr>
+              <a:buFontTx/>
+              <a:buChar char="-"/>
+            </a:pPr>
+            <a:endParaRPr lang="en-US" dirty="0" smtClean="0"/>
+          </a:p>
+          <a:p>
+            <a:pPr>
+              <a:buFontTx/>
+              <a:buChar char="-"/>
+            </a:pPr>
+            <a:endParaRPr lang="en-US" dirty="0" smtClean="0"/>
+          </a:p>
+          <a:p>
+            <a:pPr>
+              <a:buFontTx/>
+              <a:buChar char="-"/>
+            </a:pPr>
+            <a:endParaRPr lang="en-US" dirty="0" smtClean="0"/>
+          </a:p>
+          <a:p>
+            <a:pPr>
+              <a:buFontTx/>
+              <a:buChar char="-"/>
+            </a:pPr>
+            <a:endParaRPr lang="en-US" dirty="0" smtClean="0"/>
+          </a:p>
+          <a:p>
+            <a:pPr>
+              <a:buFontTx/>
+              <a:buChar char="-"/>
+            </a:pPr>
+            <a:endParaRPr lang="en-US" dirty="0" smtClean="0"/>
+          </a:p>
+          <a:p>
+            <a:pPr>
+              <a:buFontTx/>
+              <a:buChar char="-"/>
+            </a:pPr>
+            <a:endParaRPr lang="en-US" dirty="0"/>
+          </a:p>
+        </p:txBody>
+      </p:sp>
+      <p:pic>
+        <p:nvPicPr>
+          <p:cNvPr id="1026" name="Picture 2" descr="C:\Users\Korisnik\Desktop\Untitled.jpg"/>
+          <p:cNvPicPr>
+            <a:picLocks noChangeAspect="1" noChangeArrowheads="1"/>
+          </p:cNvPicPr>
+          <p:nvPr/>
+        </p:nvPicPr>
+        <p:blipFill>
+          <a:blip r:embed="rId2" cstate="print"/>
+          <a:srcRect/>
+          <a:stretch>
+            <a:fillRect/>
+          </a:stretch>
+        </p:blipFill>
+        <p:spPr bwMode="auto">
+          <a:xfrm>
+            <a:off x="1905000" y="2590800"/>
+            <a:ext cx="4893578" cy="2667000"/>
+          </a:xfrm>
+          <a:prstGeom prst="rect">
+            <a:avLst/>
+          </a:prstGeom>
+          <a:noFill/>
+        </p:spPr>
+      </p:pic>
+    </p:spTree>
+  </p:cSld>
+  <p:clrMapOvr>
+    <a:masterClrMapping/>
+  </p:clrMapOvr>
+</p:sld>
+</file>
+
+<file path=ppt/slides/slide4.xml><?xml version="1.0" encoding="utf-8"?>
 <p:sld xmlns:a="http://schemas.openxmlformats.org/drawingml/2006/main" xmlns:r="http://schemas.openxmlformats.org/officeDocument/2006/relationships" xmlns:p="http://schemas.openxmlformats.org/presentationml/2006/main">
   <p:cSld>
     <p:spTree>

</xml_diff>

<commit_message>
Edited last diagram for better visualisation
</commit_message>
<xml_diff>
--- a/Prediction of Stock Market Prices.pptx
+++ b/Prediction of Stock Market Prices.pptx
@@ -4325,9 +4325,6 @@
               </a:rPr>
               <a:t> (Tensor Processing Unit) which is now in Beta version but it is stronger that the strongest NVIDIA GPU.</a:t>
             </a:r>
-            <a:endParaRPr lang="en-US" dirty="0" smtClean="0">
-              <a:latin typeface="+mj-lt"/>
-            </a:endParaRPr>
           </a:p>
           <a:p>
             <a:pPr>
@@ -4513,19 +4510,7 @@
               <a:rPr lang="en-US" dirty="0" smtClean="0">
                 <a:latin typeface="+mj-lt"/>
               </a:rPr>
-              <a:t>Downloaded from historical data on </a:t>
-            </a:r>
-            <a:r>
-              <a:rPr lang="en-US" dirty="0" smtClean="0">
-                <a:latin typeface="+mj-lt"/>
-              </a:rPr>
-              <a:t>website</a:t>
-            </a:r>
-            <a:r>
-              <a:rPr lang="en-US" dirty="0" smtClean="0">
-                <a:latin typeface="+mj-lt"/>
-              </a:rPr>
-              <a:t>: </a:t>
+              <a:t>Downloaded from historical data on website: </a:t>
             </a:r>
             <a:r>
               <a:rPr lang="en-US" dirty="0" smtClean="0">
@@ -4782,7 +4767,7 @@
       </p:pic>
       <p:pic>
         <p:nvPicPr>
-          <p:cNvPr id="1027" name="Picture 3" descr="C:\Users\Korisnik\Desktop\Untitled.jpg"/>
+          <p:cNvPr id="4" name="Picture 2" descr="C:\Users\Korisnik\Desktop\Untitled.jpg"/>
           <p:cNvPicPr>
             <a:picLocks noChangeAspect="1" noChangeArrowheads="1"/>
           </p:cNvPicPr>
@@ -4797,8 +4782,8 @@
         </p:blipFill>
         <p:spPr bwMode="auto">
           <a:xfrm>
-            <a:off x="1143000" y="3810000"/>
-            <a:ext cx="6400800" cy="2883427"/>
+            <a:off x="762000" y="3886200"/>
+            <a:ext cx="6480972" cy="2743200"/>
           </a:xfrm>
           <a:prstGeom prst="rect">
             <a:avLst/>
@@ -4806,56 +4791,6 @@
           <a:noFill/>
         </p:spPr>
       </p:pic>
-      <p:sp>
-        <p:nvSpPr>
-          <p:cNvPr id="6" name="Oval 5"/>
-          <p:cNvSpPr/>
-          <p:nvPr/>
-        </p:nvSpPr>
-        <p:spPr>
-          <a:xfrm>
-            <a:off x="5791200" y="6096000"/>
-            <a:ext cx="1524000" cy="304800"/>
-          </a:xfrm>
-          <a:prstGeom prst="ellipse">
-            <a:avLst/>
-          </a:prstGeom>
-          <a:noFill/>
-          <a:ln>
-            <a:solidFill>
-              <a:srgbClr val="FF0000"/>
-            </a:solidFill>
-          </a:ln>
-        </p:spPr>
-        <p:style>
-          <a:lnRef idx="2">
-            <a:schemeClr val="accent1">
-              <a:shade val="50000"/>
-            </a:schemeClr>
-          </a:lnRef>
-          <a:fillRef idx="1">
-            <a:schemeClr val="accent1"/>
-          </a:fillRef>
-          <a:effectRef idx="0">
-            <a:schemeClr val="accent1"/>
-          </a:effectRef>
-          <a:fontRef idx="minor">
-            <a:schemeClr val="lt1"/>
-          </a:fontRef>
-        </p:style>
-        <p:txBody>
-          <a:bodyPr rtlCol="0" anchor="ctr"/>
-          <a:lstStyle/>
-          <a:p>
-            <a:pPr algn="ctr"/>
-            <a:endParaRPr lang="en-US" dirty="0">
-              <a:solidFill>
-                <a:srgbClr val="FF0000"/>
-              </a:solidFill>
-            </a:endParaRPr>
-          </a:p>
-        </p:txBody>
-      </p:sp>
     </p:spTree>
   </p:cSld>
   <p:clrMapOvr>
@@ -4945,11 +4880,7 @@
           <a:p>
             <a:r>
               <a:rPr lang="en-US" dirty="0" smtClean="0"/>
-              <a:t>W</a:t>
-            </a:r>
-            <a:r>
-              <a:rPr lang="en-US" dirty="0" smtClean="0"/>
-              <a:t>e </a:t>
+              <a:t>We </a:t>
             </a:r>
             <a:r>
               <a:rPr lang="en-US" dirty="0" err="1" smtClean="0"/>
@@ -5058,13 +4989,7 @@
               <a:rPr lang="en-US" dirty="0" smtClean="0">
                 <a:hlinkClick r:id="rId2"/>
               </a:rPr>
-              <a:t>https://</a:t>
-            </a:r>
-            <a:r>
-              <a:rPr lang="en-US" dirty="0" smtClean="0">
-                <a:hlinkClick r:id="rId2"/>
-              </a:rPr>
-              <a:t>en.wikipedia.org/wiki/Long_short-term_memory</a:t>
+              <a:t>https://en.wikipedia.org/wiki/Long_short-term_memory</a:t>
             </a:r>
             <a:endParaRPr lang="en-US" dirty="0" smtClean="0"/>
           </a:p>
@@ -5076,19 +5001,7 @@
               <a:rPr lang="en-US" dirty="0" smtClean="0">
                 <a:hlinkClick r:id="rId3"/>
               </a:rPr>
-              <a:t>https</a:t>
-            </a:r>
-            <a:r>
-              <a:rPr lang="en-US" dirty="0" smtClean="0">
-                <a:hlinkClick r:id="rId3"/>
-              </a:rPr>
-              <a:t>://dashee87.github.io/deep%20learning/python/predicting-cryptocurrency-prices-with-deep-learning</a:t>
-            </a:r>
-            <a:r>
-              <a:rPr lang="en-US" dirty="0" smtClean="0">
-                <a:hlinkClick r:id="rId3"/>
-              </a:rPr>
-              <a:t>/</a:t>
+              <a:t>https://dashee87.github.io/deep%20learning/python/predicting-cryptocurrency-prices-with-deep-learning/</a:t>
             </a:r>
             <a:endParaRPr lang="en-US" dirty="0" smtClean="0"/>
           </a:p>
@@ -5100,13 +5013,7 @@
               <a:rPr lang="en-US" dirty="0" smtClean="0">
                 <a:hlinkClick r:id="rId4"/>
               </a:rPr>
-              <a:t>https://colah.github.io/posts/2015-08-Understanding-LSTMs</a:t>
-            </a:r>
-            <a:r>
-              <a:rPr lang="en-US" dirty="0" smtClean="0">
-                <a:hlinkClick r:id="rId4"/>
-              </a:rPr>
-              <a:t>/</a:t>
+              <a:t>https://colah.github.io/posts/2015-08-Understanding-LSTMs/</a:t>
             </a:r>
             <a:endParaRPr lang="en-US" dirty="0" smtClean="0"/>
           </a:p>
@@ -5118,13 +5025,7 @@
               <a:rPr lang="en-US" dirty="0" smtClean="0">
                 <a:hlinkClick r:id="rId5"/>
               </a:rPr>
-              <a:t>https://</a:t>
-            </a:r>
-            <a:r>
-              <a:rPr lang="en-US" dirty="0" smtClean="0">
-                <a:hlinkClick r:id="rId5"/>
-              </a:rPr>
-              <a:t>www.youtube.com/watch?v=zwqwlR48ztQ</a:t>
+              <a:t>https://www.youtube.com/watch?v=zwqwlR48ztQ</a:t>
             </a:r>
             <a:endParaRPr lang="en-US" dirty="0" smtClean="0"/>
           </a:p>
@@ -5136,13 +5037,7 @@
               <a:rPr lang="en-US" dirty="0" smtClean="0">
                 <a:hlinkClick r:id="rId6"/>
               </a:rPr>
-              <a:t>https://</a:t>
-            </a:r>
-            <a:r>
-              <a:rPr lang="en-US" dirty="0" smtClean="0">
-                <a:hlinkClick r:id="rId6"/>
-              </a:rPr>
-              <a:t>www.youtube.com/watch?v=2np77NOdnwk</a:t>
+              <a:t>https://www.youtube.com/watch?v=2np77NOdnwk</a:t>
             </a:r>
             <a:endParaRPr lang="en-US" dirty="0" smtClean="0"/>
           </a:p>
@@ -5187,13 +5082,7 @@
               <a:rPr lang="en-US" dirty="0" smtClean="0">
                 <a:hlinkClick r:id="rId7"/>
               </a:rPr>
-              <a:t>https://medium.com/@</a:t>
-            </a:r>
-            <a:r>
-              <a:rPr lang="en-US" dirty="0" smtClean="0">
-                <a:hlinkClick r:id="rId7"/>
-              </a:rPr>
-              <a:t>anishsingh20/the-vanishing-gradient-problem-48ae7f501257</a:t>
+              <a:t>https://medium.com/@anishsingh20/the-vanishing-gradient-problem-48ae7f501257</a:t>
             </a:r>
             <a:endParaRPr lang="sr-Latn-CS" dirty="0" smtClean="0"/>
           </a:p>
@@ -5205,13 +5094,7 @@
               <a:rPr lang="en-US" dirty="0" smtClean="0">
                 <a:hlinkClick r:id="rId8"/>
               </a:rPr>
-              <a:t>https://</a:t>
-            </a:r>
-            <a:r>
-              <a:rPr lang="en-US" dirty="0" smtClean="0">
-                <a:hlinkClick r:id="rId8"/>
-              </a:rPr>
-              <a:t>towardsdatascience.com/recurrent-neural-networks-d4642c9bc7ce</a:t>
+              <a:t>https://towardsdatascience.com/recurrent-neural-networks-d4642c9bc7ce</a:t>
             </a:r>
             <a:endParaRPr lang="sr-Latn-CS" dirty="0" smtClean="0"/>
           </a:p>
@@ -5223,13 +5106,7 @@
               <a:rPr lang="en-US" dirty="0" smtClean="0">
                 <a:hlinkClick r:id="rId9"/>
               </a:rPr>
-              <a:t>https://</a:t>
-            </a:r>
-            <a:r>
-              <a:rPr lang="en-US" dirty="0" smtClean="0">
-                <a:hlinkClick r:id="rId9"/>
-              </a:rPr>
-              <a:t>skymind.ai/wiki/lstm</a:t>
+              <a:t>https://skymind.ai/wiki/lstm</a:t>
             </a:r>
             <a:endParaRPr lang="sr-Latn-CS" dirty="0" smtClean="0"/>
           </a:p>

</xml_diff>